<commit_message>
init commit splitting verses
</commit_message>
<xml_diff>
--- a/template.pptx
+++ b/template.pptx
@@ -230,7 +230,7 @@
           <a:p>
             <a:fld id="{B73CC1CC-9F6A-4ADD-A688-31BF20A1930C}" type="datetimeFigureOut">
               <a:rPr lang="en-PH" smtClean="0"/>
-              <a:t>9/15/2019</a:t>
+              <a:t>10/6/2019</a:t>
             </a:fld>
             <a:endParaRPr lang="en-PH"/>
           </a:p>
@@ -407,7 +407,7 @@
           <a:p>
             <a:fld id="{9988819C-A0F5-4482-9A5A-179F93484254}" type="datetimeFigureOut">
               <a:rPr lang="en-PH" smtClean="0"/>
-              <a:t>9/15/2019</a:t>
+              <a:t>10/6/2019</a:t>
             </a:fld>
             <a:endParaRPr lang="en-PH" dirty="0"/>
           </a:p>
@@ -1160,8 +1160,8 @@
         </p:nvSpPr>
         <p:spPr>
           <a:xfrm>
-            <a:off x="305497" y="3702200"/>
-            <a:ext cx="5934682" cy="1854346"/>
+            <a:off x="305497" y="4230102"/>
+            <a:ext cx="5934682" cy="1300348"/>
           </a:xfrm>
           <a:prstGeom prst="rect">
             <a:avLst/>
@@ -1318,7 +1318,7 @@
           <a:p>
             <a:pPr marL="117475" algn="l"/>
             <a:r>
-              <a:rPr lang="en-PH" sz="2800" dirty="0">
+              <a:rPr lang="en-PH" sz="2000" dirty="0">
                 <a:solidFill>
                   <a:srgbClr val="FFFF00"/>
                 </a:solidFill>
@@ -1333,10 +1333,10 @@
           <a:p>
             <a:pPr marL="117475" algn="l"/>
             <a:r>
-              <a:rPr lang="en-PH" sz="2200" dirty="0">
+              <a:rPr lang="en-PH" sz="2000" dirty="0">
                 <a:effectLst/>
-                <a:latin typeface="Palatino"/>
-                <a:ea typeface="Source Sans Pro" panose="020B0503030403020204" pitchFamily="34" charset="0"/>
+                <a:latin typeface="Source Sans Pro Semibold" panose="020B0603030403020204" pitchFamily="34" charset="0"/>
+                <a:ea typeface="Source Sans Pro Semibold" panose="020B0603030403020204" pitchFamily="34" charset="0"/>
                 <a:cs typeface="Open Sans" panose="020B0606030504020204" pitchFamily="34" charset="0"/>
               </a:rPr>
               <a:t>20 But lay up for yourselves treasures in heaven, where neither moth nor rust doth corrupt, and where thieves do not break through nor steal.</a:t>
@@ -1388,8 +1388,8 @@
         </p:nvSpPr>
         <p:spPr>
           <a:xfrm>
-            <a:off x="340242" y="4237627"/>
-            <a:ext cx="5782976" cy="1241229"/>
+            <a:off x="340242" y="4331177"/>
+            <a:ext cx="5782976" cy="1054127"/>
           </a:xfrm>
           <a:prstGeom prst="rect">
             <a:avLst/>
@@ -1558,7 +1558,7 @@
           <a:p>
             <a:pPr marL="117475" lvl="1"/>
             <a:r>
-              <a:rPr lang="en-PH" sz="3200" b="1" dirty="0">
+              <a:rPr lang="en-PH" sz="2400" b="1" dirty="0">
                 <a:effectLst>
                   <a:outerShdw blurRad="38100" dist="38100" dir="2700000" algn="tl">
                     <a:srgbClr val="000000">
@@ -1576,7 +1576,7 @@
           <a:p>
             <a:pPr marL="355600" lvl="1" indent="-238125"/>
             <a:r>
-              <a:rPr lang="en-PH" sz="2208" b="1" dirty="0">
+              <a:rPr lang="en-PH" sz="2000" b="1" dirty="0">
                 <a:solidFill>
                   <a:srgbClr val="000000"/>
                 </a:solidFill>
@@ -1596,7 +1596,7 @@
           <a:p>
             <a:pPr marL="355600" lvl="1" indent="-238125"/>
             <a:r>
-              <a:rPr lang="en-US" sz="2208" b="1" dirty="0">
+              <a:rPr lang="en-US" sz="2000" b="1" dirty="0">
                 <a:effectLst>
                   <a:outerShdw blurRad="38100" dist="38100" dir="2700000" algn="tl">
                     <a:srgbClr val="000000">
@@ -1656,8 +1656,8 @@
         </p:nvSpPr>
         <p:spPr>
           <a:xfrm>
-            <a:off x="304800" y="3760016"/>
-            <a:ext cx="5818418" cy="1794009"/>
+            <a:off x="304800" y="4203077"/>
+            <a:ext cx="5818418" cy="1331126"/>
           </a:xfrm>
           <a:prstGeom prst="rect">
             <a:avLst/>
@@ -1826,9 +1826,9 @@
           <a:p>
             <a:pPr marL="355600" lvl="1" indent="-303213"/>
             <a:r>
-              <a:rPr lang="en-PH" sz="3608" b="1" dirty="0">
-                <a:latin typeface="Trajan Pro" panose="02020502050506020301" pitchFamily="18" charset="0"/>
-                <a:ea typeface="Source Sans Pro" panose="020B0503030403020204" pitchFamily="34" charset="0"/>
+              <a:rPr lang="en-PH" sz="2800" dirty="0">
+                <a:latin typeface="Space Grotesk Bold" panose="00000800000000000000" pitchFamily="50" charset="0"/>
+                <a:ea typeface="Source Sans Pro Black" panose="020B0803030403020204" pitchFamily="34" charset="0"/>
                 <a:cs typeface="Open Sans" panose="020B0606030504020204" pitchFamily="34" charset="0"/>
               </a:rPr>
               <a:t>Title………………………</a:t>
@@ -1837,7 +1837,7 @@
           <a:p>
             <a:pPr marL="355600" lvl="1" indent="-303213"/>
             <a:r>
-              <a:rPr lang="en-PH" sz="2400" b="1" i="1" dirty="0">
+              <a:rPr lang="en-PH" sz="1600" b="1" i="1" dirty="0">
                 <a:effectLst>
                   <a:outerShdw blurRad="38100" dist="38100" dir="2700000" algn="tl">
                     <a:srgbClr val="000000">
@@ -1853,7 +1853,7 @@
           <a:p>
             <a:pPr marL="355600" lvl="1" indent="-303213"/>
             <a:r>
-              <a:rPr lang="en-US" sz="2000" b="1" i="1" dirty="0">
+              <a:rPr lang="en-US" sz="1400" b="1" i="1" dirty="0">
                 <a:solidFill>
                   <a:schemeClr val="tx2">
                     <a:lumMod val="50000"/>
@@ -1875,7 +1875,7 @@
           <a:p>
             <a:pPr marL="355600" lvl="1" indent="-303213"/>
             <a:r>
-              <a:rPr lang="en-US" sz="1600" b="1" i="1" dirty="0">
+              <a:rPr lang="en-US" sz="1100" b="1" i="1" dirty="0">
                 <a:effectLst>
                   <a:outerShdw blurRad="38100" dist="38100" dir="2700000" algn="tl">
                     <a:srgbClr val="000000">
@@ -1892,7 +1892,7 @@
           <a:p>
             <a:pPr marL="355600" lvl="1" indent="-303213"/>
             <a:r>
-              <a:rPr lang="en-US" sz="1600" b="1" i="1" dirty="0">
+              <a:rPr lang="en-US" sz="1100" b="1" i="1" dirty="0">
                 <a:solidFill>
                   <a:schemeClr val="tx2">
                     <a:lumMod val="50000"/>
@@ -2167,8 +2167,8 @@
         </p:nvSpPr>
         <p:spPr bwMode="auto">
           <a:xfrm>
-            <a:off x="310728" y="4075835"/>
-            <a:ext cx="5567937" cy="992571"/>
+            <a:off x="310728" y="4170104"/>
+            <a:ext cx="5567937" cy="931016"/>
           </a:xfrm>
           <a:prstGeom prst="rect">
             <a:avLst/>
@@ -2198,23 +2198,25 @@
           <a:p>
             <a:pPr marL="52388" lvl="1"/>
             <a:r>
-              <a:rPr lang="en-PH" sz="3000" b="1" dirty="0" err="1">
+              <a:rPr lang="en-PH" sz="2800" b="1" dirty="0" err="1">
                 <a:solidFill>
                   <a:schemeClr val="tx2">
                     <a:lumMod val="50000"/>
                   </a:schemeClr>
                 </a:solidFill>
-                <a:latin typeface="Palatino"/>
+                <a:latin typeface="Source Sans Pro Semibold" panose="020B0603030403020204" pitchFamily="34" charset="0"/>
+                <a:ea typeface="Source Sans Pro Semibold" panose="020B0603030403020204" pitchFamily="34" charset="0"/>
               </a:rPr>
-              <a:t>Pointttttttttttttttttttttttttttttttttttttttttt</a:t>
+              <a:t>Pointtttttttttttttttttttttttttttttttttttttttttttttttt</a:t>
             </a:r>
-            <a:endParaRPr lang="en-PH" sz="3000" b="1" dirty="0">
+            <a:endParaRPr lang="en-PH" sz="2800" b="1" dirty="0">
               <a:solidFill>
                 <a:schemeClr val="tx2">
                   <a:lumMod val="50000"/>
                 </a:schemeClr>
               </a:solidFill>
-              <a:latin typeface="Palatino"/>
+              <a:latin typeface="Source Sans Pro Semibold" panose="020B0603030403020204" pitchFamily="34" charset="0"/>
+              <a:ea typeface="Source Sans Pro Semibold" panose="020B0603030403020204" pitchFamily="34" charset="0"/>
             </a:endParaRPr>
           </a:p>
         </p:txBody>
@@ -2405,8 +2407,8 @@
           <a:p>
             <a:pPr marL="457200" lvl="2" indent="-404813"/>
             <a:r>
-              <a:rPr lang="en-PH" sz="2000" dirty="0">
-                <a:latin typeface="+mj-lt"/>
+              <a:rPr lang="en-PH" sz="2000" b="1" dirty="0">
+                <a:latin typeface="Space Grotesk Bold" panose="00000800000000000000" pitchFamily="50" charset="0"/>
               </a:rPr>
               <a:t>Some Title</a:t>
             </a:r>

</xml_diff>

<commit_message>
split verse first commit
</commit_message>
<xml_diff>
--- a/template.pptx
+++ b/template.pptx
@@ -117,7 +117,7 @@
   <p:extLst>
     <p:ext uri="{EFAFB233-063F-42B5-8137-9DF3F51BA10A}">
       <p15:sldGuideLst xmlns:p15="http://schemas.microsoft.com/office/powerpoint/2012/main">
-        <p15:guide id="1" orient="horz" pos="1800" userDrawn="1">
+        <p15:guide id="1" orient="horz" pos="2664" userDrawn="1">
           <p15:clr>
             <a:srgbClr val="A4A3A4"/>
           </p15:clr>
@@ -230,7 +230,7 @@
           <a:p>
             <a:fld id="{B73CC1CC-9F6A-4ADD-A688-31BF20A1930C}" type="datetimeFigureOut">
               <a:rPr lang="en-PH" smtClean="0"/>
-              <a:t>10/6/2019</a:t>
+              <a:t>11/3/2019</a:t>
             </a:fld>
             <a:endParaRPr lang="en-PH"/>
           </a:p>
@@ -407,7 +407,7 @@
           <a:p>
             <a:fld id="{9988819C-A0F5-4482-9A5A-179F93484254}" type="datetimeFigureOut">
               <a:rPr lang="en-PH" smtClean="0"/>
-              <a:t>10/6/2019</a:t>
+              <a:t>11/3/2019</a:t>
             </a:fld>
             <a:endParaRPr lang="en-PH" dirty="0"/>
           </a:p>
@@ -1160,15 +1160,15 @@
         </p:nvSpPr>
         <p:spPr>
           <a:xfrm>
-            <a:off x="305497" y="4230102"/>
-            <a:ext cx="5934682" cy="1300348"/>
+            <a:off x="305497" y="3899902"/>
+            <a:ext cx="5934682" cy="1706613"/>
           </a:xfrm>
           <a:prstGeom prst="rect">
             <a:avLst/>
           </a:prstGeom>
           <a:solidFill>
-            <a:schemeClr val="accent1">
-              <a:lumMod val="50000"/>
+            <a:schemeClr val="bg2">
+              <a:lumMod val="25000"/>
             </a:schemeClr>
           </a:solidFill>
           <a:ln w="31750">
@@ -1320,10 +1320,10 @@
             <a:r>
               <a:rPr lang="en-PH" sz="2000" dirty="0">
                 <a:solidFill>
-                  <a:srgbClr val="FFFF00"/>
+                  <a:srgbClr val="FFD966"/>
                 </a:solidFill>
                 <a:effectLst/>
-                <a:latin typeface="Palatino Linotype" panose="02040502050505030304" pitchFamily="18" charset="0"/>
+                <a:latin typeface="Univers" panose="020B0503020202020204" pitchFamily="34" charset="0"/>
                 <a:ea typeface="Source Sans Pro" panose="020B0503030403020204" pitchFamily="34" charset="0"/>
                 <a:cs typeface="Open Sans" panose="020B0606030504020204" pitchFamily="34" charset="0"/>
               </a:rPr>
@@ -1331,13 +1331,15 @@
             </a:r>
           </a:p>
           <a:p>
-            <a:pPr marL="117475" algn="l"/>
+            <a:pPr marL="117475" algn="l">
+              <a:lnSpc>
+                <a:spcPct val="90000"/>
+              </a:lnSpc>
+            </a:pPr>
             <a:r>
-              <a:rPr lang="en-PH" sz="2000" dirty="0">
-                <a:effectLst/>
-                <a:latin typeface="Source Sans Pro Semibold" panose="020B0603030403020204" pitchFamily="34" charset="0"/>
-                <a:ea typeface="Source Sans Pro Semibold" panose="020B0603030403020204" pitchFamily="34" charset="0"/>
-                <a:cs typeface="Open Sans" panose="020B0606030504020204" pitchFamily="34" charset="0"/>
+              <a:rPr lang="en-PH" dirty="0">
+                <a:latin typeface="Univers LT Std 45 Light" panose="020B0703030502020204" pitchFamily="34" charset="0"/>
+                <a:cs typeface="+mj-cs"/>
               </a:rPr>
               <a:t>20 But lay up for yourselves treasures in heaven, where neither moth nor rust doth corrupt, and where thieves do not break through nor steal.</a:t>
             </a:r>
@@ -1388,29 +1390,17 @@
         </p:nvSpPr>
         <p:spPr>
           <a:xfrm>
-            <a:off x="340242" y="4331177"/>
+            <a:off x="340242" y="4236907"/>
             <a:ext cx="5782976" cy="1054127"/>
           </a:xfrm>
           <a:prstGeom prst="rect">
             <a:avLst/>
           </a:prstGeom>
-          <a:gradFill flip="none" rotWithShape="1">
-            <a:gsLst>
-              <a:gs pos="12000">
-                <a:schemeClr val="accent1">
-                  <a:lumMod val="50000"/>
-                </a:schemeClr>
-              </a:gs>
-              <a:gs pos="75000">
-                <a:schemeClr val="accent5">
-                  <a:lumMod val="60000"/>
-                  <a:lumOff val="40000"/>
-                </a:schemeClr>
-              </a:gs>
-            </a:gsLst>
-            <a:lin ang="8100000" scaled="1"/>
-            <a:tileRect/>
-          </a:gradFill>
+          <a:solidFill>
+            <a:schemeClr val="bg2">
+              <a:lumMod val="25000"/>
+            </a:schemeClr>
+          </a:solidFill>
           <a:ln w="31750">
             <a:solidFill>
               <a:schemeClr val="bg1"/>
@@ -1559,6 +1549,9 @@
             <a:pPr marL="117475" lvl="1"/>
             <a:r>
               <a:rPr lang="en-PH" sz="2400" b="1" dirty="0">
+                <a:solidFill>
+                  <a:srgbClr val="FFD966"/>
+                </a:solidFill>
                 <a:effectLst>
                   <a:outerShdw blurRad="38100" dist="38100" dir="2700000" algn="tl">
                     <a:srgbClr val="000000">
@@ -1577,16 +1570,6 @@
             <a:pPr marL="355600" lvl="1" indent="-238125"/>
             <a:r>
               <a:rPr lang="en-PH" sz="2000" b="1" dirty="0">
-                <a:solidFill>
-                  <a:srgbClr val="000000"/>
-                </a:solidFill>
-                <a:effectLst>
-                  <a:outerShdw blurRad="38100" dist="38100" dir="2700000" algn="tl">
-                    <a:srgbClr val="000000">
-                      <a:alpha val="43137"/>
-                    </a:srgbClr>
-                  </a:outerShdw>
-                </a:effectLst>
                 <a:latin typeface="Source Sans Pro" panose="020B0503030403020204" pitchFamily="34" charset="0"/>
                 <a:ea typeface="Source Sans Pro" panose="020B0503030403020204" pitchFamily="34" charset="0"/>
               </a:rPr>
@@ -1597,13 +1580,9 @@
             <a:pPr marL="355600" lvl="1" indent="-238125"/>
             <a:r>
               <a:rPr lang="en-US" sz="2000" b="1" dirty="0">
-                <a:effectLst>
-                  <a:outerShdw blurRad="38100" dist="38100" dir="2700000" algn="tl">
-                    <a:srgbClr val="000000">
-                      <a:alpha val="43137"/>
-                    </a:srgbClr>
-                  </a:outerShdw>
-                </a:effectLst>
+                <a:solidFill>
+                  <a:srgbClr val="FFD966"/>
+                </a:solidFill>
                 <a:latin typeface="Source Sans Pro" panose="020B0503030403020204" pitchFamily="34" charset="0"/>
                 <a:ea typeface="Source Sans Pro" panose="020B0503030403020204" pitchFamily="34" charset="0"/>
               </a:rPr>
@@ -1656,29 +1635,17 @@
         </p:nvSpPr>
         <p:spPr>
           <a:xfrm>
-            <a:off x="304800" y="4203077"/>
-            <a:ext cx="5818418" cy="1331126"/>
+            <a:off x="304800" y="4250212"/>
+            <a:ext cx="5818418" cy="1300348"/>
           </a:xfrm>
           <a:prstGeom prst="rect">
             <a:avLst/>
           </a:prstGeom>
-          <a:gradFill flip="none" rotWithShape="1">
-            <a:gsLst>
-              <a:gs pos="12000">
-                <a:schemeClr val="accent1">
-                  <a:lumMod val="50000"/>
-                </a:schemeClr>
-              </a:gs>
-              <a:gs pos="75000">
-                <a:schemeClr val="accent5">
-                  <a:lumMod val="60000"/>
-                  <a:lumOff val="40000"/>
-                </a:schemeClr>
-              </a:gs>
-            </a:gsLst>
-            <a:lin ang="8100000" scaled="1"/>
-            <a:tileRect/>
-          </a:gradFill>
+          <a:solidFill>
+            <a:schemeClr val="bg2">
+              <a:lumMod val="25000"/>
+            </a:schemeClr>
+          </a:solidFill>
           <a:ln w="31750">
             <a:solidFill>
               <a:schemeClr val="bg1"/>
@@ -1826,7 +1793,17 @@
           <a:p>
             <a:pPr marL="355600" lvl="1" indent="-303213"/>
             <a:r>
-              <a:rPr lang="en-PH" sz="2800" dirty="0">
+              <a:rPr lang="en-PH" sz="2000" dirty="0">
+                <a:solidFill>
+                  <a:srgbClr val="FFD966"/>
+                </a:solidFill>
+                <a:effectLst>
+                  <a:outerShdw blurRad="38100" dist="38100" dir="2700000" algn="tl">
+                    <a:srgbClr val="000000">
+                      <a:alpha val="43137"/>
+                    </a:srgbClr>
+                  </a:outerShdw>
+                </a:effectLst>
                 <a:latin typeface="Space Grotesk Bold" panose="00000800000000000000" pitchFamily="50" charset="0"/>
                 <a:ea typeface="Source Sans Pro Black" panose="020B0803030403020204" pitchFamily="34" charset="0"/>
                 <a:cs typeface="Open Sans" panose="020B0606030504020204" pitchFamily="34" charset="0"/>
@@ -1838,13 +1815,6 @@
             <a:pPr marL="355600" lvl="1" indent="-303213"/>
             <a:r>
               <a:rPr lang="en-PH" sz="1600" b="1" i="1" dirty="0">
-                <a:effectLst>
-                  <a:outerShdw blurRad="38100" dist="38100" dir="2700000" algn="tl">
-                    <a:srgbClr val="000000">
-                      <a:alpha val="43137"/>
-                    </a:srgbClr>
-                  </a:outerShdw>
-                </a:effectLst>
                 <a:latin typeface="+mn-lt"/>
               </a:rPr>
               <a:t>Some Text</a:t>
@@ -1853,19 +1823,10 @@
           <a:p>
             <a:pPr marL="355600" lvl="1" indent="-303213"/>
             <a:r>
-              <a:rPr lang="en-US" sz="1400" b="1" i="1" dirty="0">
-                <a:solidFill>
-                  <a:schemeClr val="tx2">
-                    <a:lumMod val="50000"/>
-                  </a:schemeClr>
-                </a:solidFill>
-                <a:effectLst>
-                  <a:outerShdw blurRad="38100" dist="38100" dir="2700000" algn="tl">
-                    <a:srgbClr val="000000">
-                      <a:alpha val="43137"/>
-                    </a:srgbClr>
-                  </a:outerShdw>
-                </a:effectLst>
+              <a:rPr lang="en-US" sz="1600" b="1" i="1" dirty="0">
+                <a:solidFill>
+                  <a:srgbClr val="FFD966"/>
+                </a:solidFill>
                 <a:latin typeface="Source Sans Pro" panose="020B0503030403020204" pitchFamily="34" charset="0"/>
                 <a:ea typeface="Source Sans Pro" panose="020B0503030403020204" pitchFamily="34" charset="0"/>
               </a:rPr>
@@ -1875,14 +1836,7 @@
           <a:p>
             <a:pPr marL="355600" lvl="1" indent="-303213"/>
             <a:r>
-              <a:rPr lang="en-US" sz="1100" b="1" i="1" dirty="0">
-                <a:effectLst>
-                  <a:outerShdw blurRad="38100" dist="38100" dir="2700000" algn="tl">
-                    <a:srgbClr val="000000">
-                      <a:alpha val="43137"/>
-                    </a:srgbClr>
-                  </a:outerShdw>
-                </a:effectLst>
+              <a:rPr lang="en-US" sz="1400" b="1" i="1" dirty="0">
                 <a:latin typeface="Source Sans Pro" panose="020B0503030403020204" pitchFamily="34" charset="0"/>
                 <a:ea typeface="Source Sans Pro" panose="020B0503030403020204" pitchFamily="34" charset="0"/>
               </a:rPr>
@@ -1892,19 +1846,10 @@
           <a:p>
             <a:pPr marL="355600" lvl="1" indent="-303213"/>
             <a:r>
-              <a:rPr lang="en-US" sz="1100" b="1" i="1" dirty="0">
-                <a:solidFill>
-                  <a:schemeClr val="tx2">
-                    <a:lumMod val="50000"/>
-                  </a:schemeClr>
-                </a:solidFill>
-                <a:effectLst>
-                  <a:outerShdw blurRad="38100" dist="38100" dir="2700000" algn="tl">
-                    <a:srgbClr val="000000">
-                      <a:alpha val="43137"/>
-                    </a:srgbClr>
-                  </a:outerShdw>
-                </a:effectLst>
+              <a:rPr lang="en-US" sz="1400" b="1" i="1" dirty="0">
+                <a:solidFill>
+                  <a:srgbClr val="FFD966"/>
+                </a:solidFill>
                 <a:latin typeface="Source Sans Pro" panose="020B0503030403020204" pitchFamily="34" charset="0"/>
                 <a:ea typeface="Source Sans Pro" panose="020B0503030403020204" pitchFamily="34" charset="0"/>
               </a:rPr>
@@ -2167,7 +2112,7 @@
         </p:nvSpPr>
         <p:spPr bwMode="auto">
           <a:xfrm>
-            <a:off x="310728" y="4170104"/>
+            <a:off x="310728" y="4245520"/>
             <a:ext cx="5567937" cy="931016"/>
           </a:xfrm>
           <a:prstGeom prst="rect">
@@ -2237,29 +2182,17 @@
         </p:nvSpPr>
         <p:spPr bwMode="auto">
           <a:xfrm>
-            <a:off x="310764" y="5105075"/>
+            <a:off x="310764" y="5180491"/>
             <a:ext cx="5568467" cy="377018"/>
           </a:xfrm>
           <a:prstGeom prst="rect">
             <a:avLst/>
           </a:prstGeom>
-          <a:gradFill flip="none" rotWithShape="1">
-            <a:gsLst>
-              <a:gs pos="15000">
-                <a:schemeClr val="accent1">
-                  <a:lumMod val="50000"/>
-                </a:schemeClr>
-              </a:gs>
-              <a:gs pos="85000">
-                <a:schemeClr val="accent5">
-                  <a:lumMod val="60000"/>
-                  <a:lumOff val="40000"/>
-                </a:schemeClr>
-              </a:gs>
-            </a:gsLst>
-            <a:lin ang="8100000" scaled="1"/>
-            <a:tileRect/>
-          </a:gradFill>
+          <a:solidFill>
+            <a:schemeClr val="bg2">
+              <a:lumMod val="25000"/>
+            </a:schemeClr>
+          </a:solidFill>
           <a:ln w="12700">
             <a:solidFill>
               <a:schemeClr val="tx1"/>

</xml_diff>

<commit_message>
splitting of verses to two slides
</commit_message>
<xml_diff>
--- a/template.pptx
+++ b/template.pptx
@@ -5,17 +5,18 @@
     <p:sldMasterId id="2147483650" r:id="rId1"/>
   </p:sldMasterIdLst>
   <p:notesMasterIdLst>
-    <p:notesMasterId r:id="rId7"/>
+    <p:notesMasterId r:id="rId8"/>
   </p:notesMasterIdLst>
   <p:handoutMasterIdLst>
-    <p:handoutMasterId r:id="rId8"/>
+    <p:handoutMasterId r:id="rId9"/>
   </p:handoutMasterIdLst>
   <p:sldIdLst>
     <p:sldId id="5072" r:id="rId2"/>
     <p:sldId id="5501" r:id="rId3"/>
     <p:sldId id="5499" r:id="rId4"/>
     <p:sldId id="5502" r:id="rId5"/>
-    <p:sldId id="5503" r:id="rId6"/>
+    <p:sldId id="5504" r:id="rId6"/>
+    <p:sldId id="5503" r:id="rId7"/>
   </p:sldIdLst>
   <p:sldSz cx="9144000" cy="5715000" type="screen16x10"/>
   <p:notesSz cx="6858000" cy="9144000"/>
@@ -230,7 +231,7 @@
           <a:p>
             <a:fld id="{B73CC1CC-9F6A-4ADD-A688-31BF20A1930C}" type="datetimeFigureOut">
               <a:rPr lang="en-PH" smtClean="0"/>
-              <a:t>11/3/2019</a:t>
+              <a:t>17/11/2019</a:t>
             </a:fld>
             <a:endParaRPr lang="en-PH"/>
           </a:p>
@@ -407,7 +408,7 @@
           <a:p>
             <a:fld id="{9988819C-A0F5-4482-9A5A-179F93484254}" type="datetimeFigureOut">
               <a:rPr lang="en-PH" smtClean="0"/>
-              <a:t>11/3/2019</a:t>
+              <a:t>17/11/2019</a:t>
             </a:fld>
             <a:endParaRPr lang="en-PH" dirty="0"/>
           </a:p>
@@ -2531,6 +2532,236 @@
 </file>
 
 <file path=ppt/slides/slide5.xml><?xml version="1.0" encoding="utf-8"?>
+<p:sld xmlns:a="http://schemas.openxmlformats.org/drawingml/2006/main" xmlns:r="http://schemas.openxmlformats.org/officeDocument/2006/relationships" xmlns:p="http://schemas.openxmlformats.org/presentationml/2006/main">
+  <p:cSld>
+    <p:spTree>
+      <p:nvGrpSpPr>
+        <p:cNvPr id="1" name=""/>
+        <p:cNvGrpSpPr/>
+        <p:nvPr/>
+      </p:nvGrpSpPr>
+      <p:grpSpPr>
+        <a:xfrm>
+          <a:off x="0" y="0"/>
+          <a:ext cx="0" cy="0"/>
+          <a:chOff x="0" y="0"/>
+          <a:chExt cx="0" cy="0"/>
+        </a:xfrm>
+      </p:grpSpPr>
+      <p:sp>
+        <p:nvSpPr>
+          <p:cNvPr id="4" name="TextBox 3">
+            <a:extLst>
+              <a:ext uri="{FF2B5EF4-FFF2-40B4-BE49-F238E27FC236}">
+                <a16:creationId xmlns:a16="http://schemas.microsoft.com/office/drawing/2014/main" id="{7326F6BF-9C4A-4CCC-84C9-606B4BEC4840}"/>
+              </a:ext>
+            </a:extLst>
+          </p:cNvPr>
+          <p:cNvSpPr txBox="1"/>
+          <p:nvPr/>
+        </p:nvSpPr>
+        <p:spPr>
+          <a:xfrm>
+            <a:off x="305497" y="3899902"/>
+            <a:ext cx="5934682" cy="1041816"/>
+          </a:xfrm>
+          <a:prstGeom prst="rect">
+            <a:avLst/>
+          </a:prstGeom>
+          <a:solidFill>
+            <a:schemeClr val="bg2">
+              <a:lumMod val="25000"/>
+            </a:schemeClr>
+          </a:solidFill>
+          <a:ln w="31750">
+            <a:solidFill>
+              <a:schemeClr val="bg1"/>
+            </a:solidFill>
+            <a:miter lim="800000"/>
+            <a:headEnd/>
+            <a:tailEnd/>
+          </a:ln>
+        </p:spPr>
+        <p:txBody>
+          <a:bodyPr wrap="square" lIns="0" tIns="34286" rIns="36576" bIns="34286">
+            <a:spAutoFit/>
+          </a:bodyPr>
+          <a:lstStyle>
+            <a:defPPr>
+              <a:defRPr lang="en-US"/>
+            </a:defPPr>
+            <a:lvl1pPr algn="ctr" fontAlgn="base">
+              <a:spcBef>
+                <a:spcPct val="0"/>
+              </a:spcBef>
+              <a:spcAft>
+                <a:spcPct val="0"/>
+              </a:spcAft>
+              <a:defRPr sz="2400" b="1">
+                <a:ln>
+                  <a:solidFill>
+                    <a:schemeClr val="tx1">
+                      <a:alpha val="0"/>
+                    </a:schemeClr>
+                  </a:solidFill>
+                </a:ln>
+                <a:solidFill>
+                  <a:schemeClr val="bg1"/>
+                </a:solidFill>
+                <a:effectLst>
+                  <a:outerShdw blurRad="38100" dist="38100" dir="2700000" algn="tl">
+                    <a:srgbClr val="000000">
+                      <a:alpha val="43137"/>
+                    </a:srgbClr>
+                  </a:outerShdw>
+                </a:effectLst>
+                <a:latin typeface="Lato Black" pitchFamily="34" charset="0"/>
+                <a:ea typeface="Lato Black" pitchFamily="34" charset="0"/>
+                <a:cs typeface="Lato Black" pitchFamily="34" charset="0"/>
+              </a:defRPr>
+            </a:lvl1pPr>
+            <a:lvl2pPr marL="356559" fontAlgn="base">
+              <a:spcBef>
+                <a:spcPct val="0"/>
+              </a:spcBef>
+              <a:spcAft>
+                <a:spcPct val="0"/>
+              </a:spcAft>
+              <a:defRPr sz="2808">
+                <a:solidFill>
+                  <a:schemeClr val="bg1"/>
+                </a:solidFill>
+                <a:latin typeface="Franklin Gothic Demi" pitchFamily="34" charset="0"/>
+                <a:cs typeface="Arial" charset="0"/>
+              </a:defRPr>
+            </a:lvl2pPr>
+            <a:lvl3pPr marL="713117" fontAlgn="base">
+              <a:spcBef>
+                <a:spcPct val="0"/>
+              </a:spcBef>
+              <a:spcAft>
+                <a:spcPct val="0"/>
+              </a:spcAft>
+              <a:defRPr sz="2808">
+                <a:solidFill>
+                  <a:schemeClr val="bg1"/>
+                </a:solidFill>
+                <a:latin typeface="Franklin Gothic Demi" pitchFamily="34" charset="0"/>
+                <a:cs typeface="Arial" charset="0"/>
+              </a:defRPr>
+            </a:lvl3pPr>
+            <a:lvl4pPr marL="1069676" fontAlgn="base">
+              <a:spcBef>
+                <a:spcPct val="0"/>
+              </a:spcBef>
+              <a:spcAft>
+                <a:spcPct val="0"/>
+              </a:spcAft>
+              <a:defRPr sz="2808">
+                <a:solidFill>
+                  <a:schemeClr val="bg1"/>
+                </a:solidFill>
+                <a:latin typeface="Franklin Gothic Demi" pitchFamily="34" charset="0"/>
+                <a:cs typeface="Arial" charset="0"/>
+              </a:defRPr>
+            </a:lvl4pPr>
+            <a:lvl5pPr marL="1426235" fontAlgn="base">
+              <a:spcBef>
+                <a:spcPct val="0"/>
+              </a:spcBef>
+              <a:spcAft>
+                <a:spcPct val="0"/>
+              </a:spcAft>
+              <a:defRPr sz="2808">
+                <a:solidFill>
+                  <a:schemeClr val="bg1"/>
+                </a:solidFill>
+                <a:latin typeface="Franklin Gothic Demi" pitchFamily="34" charset="0"/>
+                <a:cs typeface="Arial" charset="0"/>
+              </a:defRPr>
+            </a:lvl5pPr>
+            <a:lvl6pPr marL="1782795" defTabSz="713117">
+              <a:defRPr sz="2808">
+                <a:solidFill>
+                  <a:schemeClr val="bg1"/>
+                </a:solidFill>
+                <a:latin typeface="Franklin Gothic Demi" pitchFamily="34" charset="0"/>
+                <a:cs typeface="Arial" charset="0"/>
+              </a:defRPr>
+            </a:lvl6pPr>
+            <a:lvl7pPr marL="2139354" defTabSz="713117">
+              <a:defRPr sz="2808">
+                <a:solidFill>
+                  <a:schemeClr val="bg1"/>
+                </a:solidFill>
+                <a:latin typeface="Franklin Gothic Demi" pitchFamily="34" charset="0"/>
+                <a:cs typeface="Arial" charset="0"/>
+              </a:defRPr>
+            </a:lvl7pPr>
+            <a:lvl8pPr marL="2495912" defTabSz="713117">
+              <a:defRPr sz="2808">
+                <a:solidFill>
+                  <a:schemeClr val="bg1"/>
+                </a:solidFill>
+                <a:latin typeface="Franklin Gothic Demi" pitchFamily="34" charset="0"/>
+                <a:cs typeface="Arial" charset="0"/>
+              </a:defRPr>
+            </a:lvl8pPr>
+            <a:lvl9pPr marL="2852471" defTabSz="713117">
+              <a:defRPr sz="2808">
+                <a:solidFill>
+                  <a:schemeClr val="bg1"/>
+                </a:solidFill>
+                <a:latin typeface="Franklin Gothic Demi" pitchFamily="34" charset="0"/>
+                <a:cs typeface="Arial" charset="0"/>
+              </a:defRPr>
+            </a:lvl9pPr>
+          </a:lstStyle>
+          <a:p>
+            <a:pPr marL="117475" algn="l"/>
+            <a:r>
+              <a:rPr lang="en-PH" sz="2000" dirty="0">
+                <a:solidFill>
+                  <a:srgbClr val="FFD966"/>
+                </a:solidFill>
+                <a:effectLst/>
+                <a:latin typeface="Univers" panose="020B0503020202020204" pitchFamily="34" charset="0"/>
+                <a:ea typeface="Source Sans Pro" panose="020B0503030403020204" pitchFamily="34" charset="0"/>
+                <a:cs typeface="Open Sans" panose="020B0606030504020204" pitchFamily="34" charset="0"/>
+              </a:rPr>
+              <a:t>Matt 6:19-34 </a:t>
+            </a:r>
+          </a:p>
+          <a:p>
+            <a:pPr marL="117475" algn="l">
+              <a:lnSpc>
+                <a:spcPct val="90000"/>
+              </a:lnSpc>
+            </a:pPr>
+            <a:r>
+              <a:rPr lang="en-PH" dirty="0">
+                <a:latin typeface="Univers LT Std 45 Light" panose="020B0703030502020204" pitchFamily="34" charset="0"/>
+                <a:cs typeface="+mj-cs"/>
+              </a:rPr>
+              <a:t>20 But lay up for yourselves treasures in heaven, where neither moth nor</a:t>
+            </a:r>
+          </a:p>
+        </p:txBody>
+      </p:sp>
+    </p:spTree>
+    <p:extLst>
+      <p:ext uri="{BB962C8B-B14F-4D97-AF65-F5344CB8AC3E}">
+        <p14:creationId xmlns:p14="http://schemas.microsoft.com/office/powerpoint/2010/main" val="3514835254"/>
+      </p:ext>
+    </p:extLst>
+  </p:cSld>
+  <p:clrMapOvr>
+    <a:masterClrMapping/>
+  </p:clrMapOvr>
+</p:sld>
+</file>
+
+<file path=ppt/slides/slide6.xml><?xml version="1.0" encoding="utf-8"?>
 <p:sld xmlns:a="http://schemas.openxmlformats.org/drawingml/2006/main" xmlns:r="http://schemas.openxmlformats.org/officeDocument/2006/relationships" xmlns:p="http://schemas.openxmlformats.org/presentationml/2006/main">
   <p:cSld>
     <p:spTree>

</xml_diff>